<commit_message>
Report finished + Timer + printing results modifications
</commit_message>
<xml_diff>
--- a/Documents/soutenance/soutenanceProjet3A.pptx
+++ b/Documents/soutenance/soutenanceProjet3A.pptx
@@ -1,22 +1,29 @@
 
 <file path=ppt/presentation.xml><?xml version="1.0" encoding="utf-8"?>
-<p:presentation xmlns:a="http://schemas.openxmlformats.org/drawingml/2006/main" xmlns:r="http://schemas.openxmlformats.org/officeDocument/2006/relationships" xmlns:p="http://schemas.openxmlformats.org/presentationml/2006/main" removePersonalInfoOnSave="1" saveSubsetFonts="1">
+<p:presentation xmlns:a="http://schemas.openxmlformats.org/drawingml/2006/main" xmlns:r="http://schemas.openxmlformats.org/officeDocument/2006/relationships" xmlns:p="http://schemas.openxmlformats.org/presentationml/2006/main" firstSlideNum="0" removePersonalInfoOnSave="1" saveSubsetFonts="1">
   <p:sldMasterIdLst>
     <p:sldMasterId id="2147483648" r:id="rId2"/>
   </p:sldMasterIdLst>
   <p:notesMasterIdLst>
-    <p:notesMasterId r:id="rId4"/>
+    <p:notesMasterId r:id="rId11"/>
   </p:notesMasterIdLst>
   <p:handoutMasterIdLst>
-    <p:handoutMasterId r:id="rId5"/>
+    <p:handoutMasterId r:id="rId12"/>
   </p:handoutMasterIdLst>
   <p:sldIdLst>
     <p:sldId id="265" r:id="rId3"/>
+    <p:sldId id="267" r:id="rId4"/>
+    <p:sldId id="273" r:id="rId5"/>
+    <p:sldId id="268" r:id="rId6"/>
+    <p:sldId id="272" r:id="rId7"/>
+    <p:sldId id="269" r:id="rId8"/>
+    <p:sldId id="270" r:id="rId9"/>
+    <p:sldId id="271" r:id="rId10"/>
   </p:sldIdLst>
   <p:sldSz cx="12188825" cy="6858000"/>
   <p:notesSz cx="6858000" cy="9144000"/>
   <p:custDataLst>
-    <p:tags r:id="rId7"/>
+    <p:tags r:id="rId14"/>
   </p:custDataLst>
   <p:defaultTextStyle>
     <a:defPPr>
@@ -806,7 +813,7 @@
           <a:p>
             <a:fld id="{F93199CD-3E1B-4AE6-990F-76F925F5EA9F}" type="slidenum">
               <a:rPr lang="fr-FR" smtClean="0"/>
-              <a:t>1</a:t>
+              <a:t>0</a:t>
             </a:fld>
             <a:endParaRPr lang="fr-FR"/>
           </a:p>
@@ -3879,7 +3886,7 @@
       </p:par>
     </p:tnLst>
   </p:timing>
-  <p:hf sldNum="0" hdr="0" ftr="0" dt="0"/>
+  <p:hf hdr="0" ftr="0" dt="0"/>
   <p:txStyles>
     <p:titleStyle>
       <a:lvl1pPr algn="l" defTabSz="914400" rtl="0" eaLnBrk="1" latinLnBrk="0" hangingPunct="1">
@@ -4399,6 +4406,1639 @@
       </p:par>
     </p:tnLst>
   </p:timing>
+</p:sld>
+</file>
+
+<file path=ppt/slides/slide2.xml><?xml version="1.0" encoding="utf-8"?>
+<p:sld xmlns:a="http://schemas.openxmlformats.org/drawingml/2006/main" xmlns:r="http://schemas.openxmlformats.org/officeDocument/2006/relationships" xmlns:p="http://schemas.openxmlformats.org/presentationml/2006/main">
+  <p:cSld>
+    <p:spTree>
+      <p:nvGrpSpPr>
+        <p:cNvPr id="1" name=""/>
+        <p:cNvGrpSpPr/>
+        <p:nvPr/>
+      </p:nvGrpSpPr>
+      <p:grpSpPr>
+        <a:xfrm>
+          <a:off x="0" y="0"/>
+          <a:ext cx="0" cy="0"/>
+          <a:chOff x="0" y="0"/>
+          <a:chExt cx="0" cy="0"/>
+        </a:xfrm>
+      </p:grpSpPr>
+      <p:sp>
+        <p:nvSpPr>
+          <p:cNvPr id="2" name="Titre 1"/>
+          <p:cNvSpPr>
+            <a:spLocks noGrp="1"/>
+          </p:cNvSpPr>
+          <p:nvPr>
+            <p:ph type="title"/>
+          </p:nvPr>
+        </p:nvSpPr>
+        <p:spPr>
+          <a:xfrm>
+            <a:off x="379412" y="381000"/>
+            <a:ext cx="11506199" cy="838200"/>
+          </a:xfrm>
+        </p:spPr>
+        <p:txBody>
+          <a:bodyPr/>
+          <a:lstStyle/>
+          <a:p>
+            <a:r>
+              <a:rPr lang="fr-FR" dirty="0"/>
+              <a:t>I- Étude bibliographique et définition du cadre du projet</a:t>
+            </a:r>
+          </a:p>
+        </p:txBody>
+      </p:sp>
+      <p:sp>
+        <p:nvSpPr>
+          <p:cNvPr id="3" name="Espace réservé du contenu 2"/>
+          <p:cNvSpPr>
+            <a:spLocks noGrp="1"/>
+          </p:cNvSpPr>
+          <p:nvPr>
+            <p:ph idx="1"/>
+          </p:nvPr>
+        </p:nvSpPr>
+        <p:spPr/>
+        <p:txBody>
+          <a:bodyPr/>
+          <a:lstStyle/>
+          <a:p>
+            <a:pPr>
+              <a:buFont typeface="Wingdings" charset="2"/>
+              <a:buChar char="Ø"/>
+            </a:pPr>
+            <a:r>
+              <a:rPr lang="fr-FR" dirty="0" smtClean="0"/>
+              <a:t>Recherche sur les différentes utilisations possibles des données de navigation Web</a:t>
+            </a:r>
+          </a:p>
+          <a:p>
+            <a:pPr>
+              <a:buFont typeface="Wingdings" charset="2"/>
+              <a:buChar char="Ø"/>
+            </a:pPr>
+            <a:r>
+              <a:rPr lang="fr-FR" dirty="0" smtClean="0"/>
+              <a:t>Papier de Eugene </a:t>
+            </a:r>
+            <a:r>
+              <a:rPr lang="fr-FR" dirty="0" err="1" smtClean="0"/>
+              <a:t>Agichtein</a:t>
+            </a:r>
+            <a:r>
+              <a:rPr lang="fr-FR" dirty="0" smtClean="0"/>
+              <a:t> – </a:t>
+            </a:r>
+            <a:r>
+              <a:rPr lang="fr-FR" dirty="0" err="1" smtClean="0"/>
+              <a:t>University</a:t>
+            </a:r>
+            <a:r>
+              <a:rPr lang="fr-FR" dirty="0" smtClean="0"/>
+              <a:t> of </a:t>
+            </a:r>
+            <a:r>
+              <a:rPr lang="fr-FR" dirty="0" err="1" smtClean="0"/>
+              <a:t>Emory</a:t>
+            </a:r>
+            <a:r>
+              <a:rPr lang="fr-FR" dirty="0" smtClean="0"/>
+              <a:t> : </a:t>
+            </a:r>
+          </a:p>
+          <a:p>
+            <a:pPr lvl="1">
+              <a:buFont typeface="Wingdings" charset="2"/>
+              <a:buChar char="Ø"/>
+            </a:pPr>
+            <a:r>
+              <a:rPr lang="fr-FR" dirty="0" err="1" smtClean="0"/>
+              <a:t>Mining</a:t>
+            </a:r>
+            <a:r>
+              <a:rPr lang="fr-FR" dirty="0" smtClean="0"/>
+              <a:t> online user </a:t>
+            </a:r>
+            <a:r>
+              <a:rPr lang="fr-FR" dirty="0" err="1" smtClean="0"/>
+              <a:t>behavior</a:t>
+            </a:r>
+            <a:r>
+              <a:rPr lang="fr-FR" dirty="0" smtClean="0"/>
+              <a:t> : </a:t>
+            </a:r>
+            <a:r>
+              <a:rPr lang="fr-FR" dirty="0" err="1" smtClean="0"/>
+              <a:t>from</a:t>
+            </a:r>
+            <a:r>
+              <a:rPr lang="fr-FR" dirty="0" smtClean="0"/>
+              <a:t> </a:t>
+            </a:r>
+            <a:r>
+              <a:rPr lang="fr-FR" dirty="0" err="1" smtClean="0"/>
+              <a:t>improving</a:t>
+            </a:r>
+            <a:r>
+              <a:rPr lang="fr-FR" dirty="0" smtClean="0"/>
+              <a:t> </a:t>
+            </a:r>
+            <a:r>
+              <a:rPr lang="fr-FR" dirty="0" err="1" smtClean="0"/>
+              <a:t>search</a:t>
+            </a:r>
+            <a:r>
+              <a:rPr lang="fr-FR" dirty="0" smtClean="0"/>
+              <a:t> to </a:t>
+            </a:r>
+            <a:r>
+              <a:rPr lang="fr-FR" dirty="0" err="1" smtClean="0"/>
+              <a:t>detecting</a:t>
+            </a:r>
+            <a:r>
+              <a:rPr lang="fr-FR" dirty="0" smtClean="0"/>
+              <a:t> cognitive </a:t>
+            </a:r>
+            <a:r>
+              <a:rPr lang="fr-FR" dirty="0" err="1" smtClean="0"/>
+              <a:t>impairment</a:t>
+            </a:r>
+            <a:endParaRPr lang="fr-FR" dirty="0" smtClean="0"/>
+          </a:p>
+          <a:p>
+            <a:pPr>
+              <a:buFont typeface="Wingdings" charset="2"/>
+              <a:buChar char="Ø"/>
+            </a:pPr>
+            <a:r>
+              <a:rPr lang="fr-FR" dirty="0" smtClean="0"/>
+              <a:t>Essayer de détecter un(des) comportement(s) atypique</a:t>
+            </a:r>
+            <a:r>
+              <a:rPr lang="fr-FR" dirty="0"/>
+              <a:t>(s)</a:t>
+            </a:r>
+            <a:r>
+              <a:rPr lang="fr-FR" dirty="0" smtClean="0"/>
+              <a:t> à partir d’historiques de navigation</a:t>
+            </a:r>
+          </a:p>
+          <a:p>
+            <a:pPr>
+              <a:buFont typeface="Wingdings" charset="2"/>
+              <a:buChar char="Ø"/>
+            </a:pPr>
+            <a:r>
+              <a:rPr lang="fr-FR" dirty="0" smtClean="0"/>
+              <a:t>Parallèle avec la génétique et la détection de mutations persistantes</a:t>
+            </a:r>
+          </a:p>
+          <a:p>
+            <a:pPr lvl="1"/>
+            <a:endParaRPr lang="fr-FR" dirty="0"/>
+          </a:p>
+        </p:txBody>
+      </p:sp>
+      <p:pic>
+        <p:nvPicPr>
+          <p:cNvPr id="4" name="Image 3" descr="logominesnancy_transp.png"/>
+          <p:cNvPicPr>
+            <a:picLocks noChangeAspect="1"/>
+          </p:cNvPicPr>
+          <p:nvPr/>
+        </p:nvPicPr>
+        <p:blipFill>
+          <a:blip r:embed="rId2">
+            <a:extLst>
+              <a:ext uri="{28A0092B-C50C-407E-A947-70E740481C1C}">
+                <a14:useLocalDpi xmlns:a14="http://schemas.microsoft.com/office/drawing/2010/main" val="0"/>
+              </a:ext>
+            </a:extLst>
+          </a:blip>
+          <a:stretch>
+            <a:fillRect/>
+          </a:stretch>
+        </p:blipFill>
+        <p:spPr>
+          <a:xfrm>
+            <a:off x="-153988" y="5562600"/>
+            <a:ext cx="2183674" cy="1295400"/>
+          </a:xfrm>
+          <a:prstGeom prst="rect">
+            <a:avLst/>
+          </a:prstGeom>
+        </p:spPr>
+      </p:pic>
+      <p:sp>
+        <p:nvSpPr>
+          <p:cNvPr id="5" name="ZoneTexte 4"/>
+          <p:cNvSpPr txBox="1"/>
+          <p:nvPr/>
+        </p:nvSpPr>
+        <p:spPr>
+          <a:xfrm>
+            <a:off x="4037012" y="6324600"/>
+            <a:ext cx="4267200" cy="346249"/>
+          </a:xfrm>
+          <a:prstGeom prst="rect">
+            <a:avLst/>
+          </a:prstGeom>
+          <a:noFill/>
+        </p:spPr>
+        <p:txBody>
+          <a:bodyPr wrap="square" rtlCol="0">
+            <a:spAutoFit/>
+          </a:bodyPr>
+          <a:lstStyle/>
+          <a:p>
+            <a:pPr algn="ctr">
+              <a:lnSpc>
+                <a:spcPct val="90000"/>
+              </a:lnSpc>
+            </a:pPr>
+            <a:r>
+              <a:rPr lang="fr-FR" dirty="0" smtClean="0"/>
+              <a:t>Soutenance projet 3A – </a:t>
+            </a:r>
+            <a:r>
+              <a:rPr lang="fr-FR" dirty="0" err="1" smtClean="0"/>
+              <a:t>Lauwérière</a:t>
+            </a:r>
+            <a:r>
+              <a:rPr lang="fr-FR" dirty="0" smtClean="0"/>
+              <a:t> Fabrice</a:t>
+            </a:r>
+            <a:endParaRPr lang="fr-FR" dirty="0"/>
+          </a:p>
+        </p:txBody>
+      </p:sp>
+      <p:sp>
+        <p:nvSpPr>
+          <p:cNvPr id="6" name="Espace réservé du numéro de diapositive 5"/>
+          <p:cNvSpPr>
+            <a:spLocks noGrp="1"/>
+          </p:cNvSpPr>
+          <p:nvPr>
+            <p:ph type="sldNum" sz="quarter" idx="12"/>
+          </p:nvPr>
+        </p:nvSpPr>
+        <p:spPr/>
+        <p:txBody>
+          <a:bodyPr/>
+          <a:lstStyle/>
+          <a:p>
+            <a:fld id="{2A013F82-EE5E-44EE-A61D-E31C6657F26F}" type="slidenum">
+              <a:rPr lang="fr-FR" smtClean="0"/>
+              <a:t>1</a:t>
+            </a:fld>
+            <a:endParaRPr lang="fr-FR"/>
+          </a:p>
+        </p:txBody>
+      </p:sp>
+    </p:spTree>
+    <p:extLst>
+      <p:ext uri="{BB962C8B-B14F-4D97-AF65-F5344CB8AC3E}">
+        <p14:creationId xmlns:p14="http://schemas.microsoft.com/office/powerpoint/2010/main" val="3143375929"/>
+      </p:ext>
+    </p:extLst>
+  </p:cSld>
+  <p:clrMapOvr>
+    <a:masterClrMapping/>
+  </p:clrMapOvr>
+  <mc:AlternateContent xmlns:mc="http://schemas.openxmlformats.org/markup-compatibility/2006" xmlns:p14="http://schemas.microsoft.com/office/powerpoint/2010/main">
+    <mc:Choice Requires="p14">
+      <p:transition spd="med" p14:dur="700">
+        <p:fade/>
+      </p:transition>
+    </mc:Choice>
+    <mc:Fallback xmlns="">
+      <p:transition spd="med">
+        <p:fade/>
+      </p:transition>
+    </mc:Fallback>
+  </mc:AlternateContent>
+</p:sld>
+</file>
+
+<file path=ppt/slides/slide3.xml><?xml version="1.0" encoding="utf-8"?>
+<p:sld xmlns:a="http://schemas.openxmlformats.org/drawingml/2006/main" xmlns:r="http://schemas.openxmlformats.org/officeDocument/2006/relationships" xmlns:p="http://schemas.openxmlformats.org/presentationml/2006/main">
+  <p:cSld>
+    <p:spTree>
+      <p:nvGrpSpPr>
+        <p:cNvPr id="1" name=""/>
+        <p:cNvGrpSpPr/>
+        <p:nvPr/>
+      </p:nvGrpSpPr>
+      <p:grpSpPr>
+        <a:xfrm>
+          <a:off x="0" y="0"/>
+          <a:ext cx="0" cy="0"/>
+          <a:chOff x="0" y="0"/>
+          <a:chExt cx="0" cy="0"/>
+        </a:xfrm>
+      </p:grpSpPr>
+      <p:sp>
+        <p:nvSpPr>
+          <p:cNvPr id="2" name="Titre 1"/>
+          <p:cNvSpPr>
+            <a:spLocks noGrp="1"/>
+          </p:cNvSpPr>
+          <p:nvPr>
+            <p:ph type="title"/>
+          </p:nvPr>
+        </p:nvSpPr>
+        <p:spPr>
+          <a:xfrm>
+            <a:off x="379412" y="381000"/>
+            <a:ext cx="11506199" cy="838200"/>
+          </a:xfrm>
+        </p:spPr>
+        <p:txBody>
+          <a:bodyPr/>
+          <a:lstStyle/>
+          <a:p>
+            <a:r>
+              <a:rPr lang="fr-FR" dirty="0"/>
+              <a:t>I- </a:t>
+            </a:r>
+            <a:r>
+              <a:rPr lang="fr-FR" dirty="0" smtClean="0"/>
+              <a:t>Transposition de l’</a:t>
+            </a:r>
+            <a:r>
+              <a:rPr lang="fr-FR" dirty="0" err="1" smtClean="0"/>
+              <a:t>algo</a:t>
+            </a:r>
+            <a:endParaRPr lang="fr-FR" dirty="0"/>
+          </a:p>
+        </p:txBody>
+      </p:sp>
+      <p:sp>
+        <p:nvSpPr>
+          <p:cNvPr id="3" name="Espace réservé du contenu 2"/>
+          <p:cNvSpPr>
+            <a:spLocks noGrp="1"/>
+          </p:cNvSpPr>
+          <p:nvPr>
+            <p:ph idx="1"/>
+          </p:nvPr>
+        </p:nvSpPr>
+        <p:spPr/>
+        <p:txBody>
+          <a:bodyPr/>
+          <a:lstStyle/>
+          <a:p>
+            <a:pPr lvl="1"/>
+            <a:endParaRPr lang="fr-FR" dirty="0"/>
+          </a:p>
+        </p:txBody>
+      </p:sp>
+      <p:pic>
+        <p:nvPicPr>
+          <p:cNvPr id="4" name="Image 3" descr="logominesnancy_transp.png"/>
+          <p:cNvPicPr>
+            <a:picLocks noChangeAspect="1"/>
+          </p:cNvPicPr>
+          <p:nvPr/>
+        </p:nvPicPr>
+        <p:blipFill>
+          <a:blip r:embed="rId2">
+            <a:extLst>
+              <a:ext uri="{28A0092B-C50C-407E-A947-70E740481C1C}">
+                <a14:useLocalDpi xmlns:a14="http://schemas.microsoft.com/office/drawing/2010/main" val="0"/>
+              </a:ext>
+            </a:extLst>
+          </a:blip>
+          <a:stretch>
+            <a:fillRect/>
+          </a:stretch>
+        </p:blipFill>
+        <p:spPr>
+          <a:xfrm>
+            <a:off x="-153988" y="5562600"/>
+            <a:ext cx="2183674" cy="1295400"/>
+          </a:xfrm>
+          <a:prstGeom prst="rect">
+            <a:avLst/>
+          </a:prstGeom>
+        </p:spPr>
+      </p:pic>
+      <p:sp>
+        <p:nvSpPr>
+          <p:cNvPr id="5" name="ZoneTexte 4"/>
+          <p:cNvSpPr txBox="1"/>
+          <p:nvPr/>
+        </p:nvSpPr>
+        <p:spPr>
+          <a:xfrm>
+            <a:off x="4037012" y="6324600"/>
+            <a:ext cx="4267200" cy="346249"/>
+          </a:xfrm>
+          <a:prstGeom prst="rect">
+            <a:avLst/>
+          </a:prstGeom>
+          <a:noFill/>
+        </p:spPr>
+        <p:txBody>
+          <a:bodyPr wrap="square" rtlCol="0">
+            <a:spAutoFit/>
+          </a:bodyPr>
+          <a:lstStyle/>
+          <a:p>
+            <a:pPr algn="ctr">
+              <a:lnSpc>
+                <a:spcPct val="90000"/>
+              </a:lnSpc>
+            </a:pPr>
+            <a:r>
+              <a:rPr lang="fr-FR" dirty="0" smtClean="0"/>
+              <a:t>Soutenance projet 3A – </a:t>
+            </a:r>
+            <a:r>
+              <a:rPr lang="fr-FR" dirty="0" err="1" smtClean="0"/>
+              <a:t>Lauwérière</a:t>
+            </a:r>
+            <a:r>
+              <a:rPr lang="fr-FR" dirty="0" smtClean="0"/>
+              <a:t> Fabrice</a:t>
+            </a:r>
+            <a:endParaRPr lang="fr-FR" dirty="0"/>
+          </a:p>
+        </p:txBody>
+      </p:sp>
+      <p:sp>
+        <p:nvSpPr>
+          <p:cNvPr id="6" name="Espace réservé du numéro de diapositive 5"/>
+          <p:cNvSpPr>
+            <a:spLocks noGrp="1"/>
+          </p:cNvSpPr>
+          <p:nvPr>
+            <p:ph type="sldNum" sz="quarter" idx="12"/>
+          </p:nvPr>
+        </p:nvSpPr>
+        <p:spPr/>
+        <p:txBody>
+          <a:bodyPr/>
+          <a:lstStyle/>
+          <a:p>
+            <a:fld id="{2A013F82-EE5E-44EE-A61D-E31C6657F26F}" type="slidenum">
+              <a:rPr lang="fr-FR" smtClean="0"/>
+              <a:t>2</a:t>
+            </a:fld>
+            <a:endParaRPr lang="fr-FR"/>
+          </a:p>
+        </p:txBody>
+      </p:sp>
+    </p:spTree>
+    <p:extLst>
+      <p:ext uri="{BB962C8B-B14F-4D97-AF65-F5344CB8AC3E}">
+        <p14:creationId xmlns:p14="http://schemas.microsoft.com/office/powerpoint/2010/main" val="1819537306"/>
+      </p:ext>
+    </p:extLst>
+  </p:cSld>
+  <p:clrMapOvr>
+    <a:masterClrMapping/>
+  </p:clrMapOvr>
+  <mc:AlternateContent xmlns:mc="http://schemas.openxmlformats.org/markup-compatibility/2006" xmlns:p14="http://schemas.microsoft.com/office/powerpoint/2010/main">
+    <mc:Choice Requires="p14">
+      <p:transition spd="med" p14:dur="700">
+        <p:fade/>
+      </p:transition>
+    </mc:Choice>
+    <mc:Fallback xmlns="">
+      <p:transition spd="med">
+        <p:fade/>
+      </p:transition>
+    </mc:Fallback>
+  </mc:AlternateContent>
+</p:sld>
+</file>
+
+<file path=ppt/slides/slide4.xml><?xml version="1.0" encoding="utf-8"?>
+<p:sld xmlns:a="http://schemas.openxmlformats.org/drawingml/2006/main" xmlns:r="http://schemas.openxmlformats.org/officeDocument/2006/relationships" xmlns:p="http://schemas.openxmlformats.org/presentationml/2006/main">
+  <p:cSld>
+    <p:spTree>
+      <p:nvGrpSpPr>
+        <p:cNvPr id="1" name=""/>
+        <p:cNvGrpSpPr/>
+        <p:nvPr/>
+      </p:nvGrpSpPr>
+      <p:grpSpPr>
+        <a:xfrm>
+          <a:off x="0" y="0"/>
+          <a:ext cx="0" cy="0"/>
+          <a:chOff x="0" y="0"/>
+          <a:chExt cx="0" cy="0"/>
+        </a:xfrm>
+      </p:grpSpPr>
+      <p:sp>
+        <p:nvSpPr>
+          <p:cNvPr id="2" name="Titre 1"/>
+          <p:cNvSpPr>
+            <a:spLocks noGrp="1"/>
+          </p:cNvSpPr>
+          <p:nvPr>
+            <p:ph type="title"/>
+          </p:nvPr>
+        </p:nvSpPr>
+        <p:spPr>
+          <a:xfrm>
+            <a:off x="379412" y="381000"/>
+            <a:ext cx="11506199" cy="838200"/>
+          </a:xfrm>
+        </p:spPr>
+        <p:txBody>
+          <a:bodyPr/>
+          <a:lstStyle/>
+          <a:p>
+            <a:r>
+              <a:rPr lang="fr-FR" dirty="0" smtClean="0"/>
+              <a:t>II- Création de la ressource de travail, les historiques</a:t>
+            </a:r>
+            <a:endParaRPr lang="fr-FR" dirty="0"/>
+          </a:p>
+        </p:txBody>
+      </p:sp>
+      <p:sp>
+        <p:nvSpPr>
+          <p:cNvPr id="3" name="Espace réservé du contenu 2"/>
+          <p:cNvSpPr>
+            <a:spLocks noGrp="1"/>
+          </p:cNvSpPr>
+          <p:nvPr>
+            <p:ph idx="1"/>
+          </p:nvPr>
+        </p:nvSpPr>
+        <p:spPr>
+          <a:xfrm>
+            <a:off x="1522413" y="1904999"/>
+            <a:ext cx="9296399" cy="4114801"/>
+          </a:xfrm>
+        </p:spPr>
+        <p:txBody>
+          <a:bodyPr/>
+          <a:lstStyle/>
+          <a:p>
+            <a:pPr>
+              <a:buFont typeface="Wingdings" charset="2"/>
+              <a:buChar char="Ø"/>
+            </a:pPr>
+            <a:r>
+              <a:rPr lang="fr-FR" dirty="0" smtClean="0"/>
+              <a:t>Contrainte : doit </a:t>
+            </a:r>
+            <a:r>
+              <a:rPr lang="fr-FR" dirty="0" smtClean="0"/>
+              <a:t>être le plus proche possible d’un historique de navigation d’un vraie personne</a:t>
+            </a:r>
+          </a:p>
+          <a:p>
+            <a:pPr>
+              <a:buFont typeface="Wingdings" charset="2"/>
+              <a:buChar char="Ø"/>
+            </a:pPr>
+            <a:r>
+              <a:rPr lang="fr-FR" dirty="0" smtClean="0"/>
+              <a:t>Problème : impossible d’en récupérer suffisamment (sondage, virus…)</a:t>
+            </a:r>
+          </a:p>
+          <a:p>
+            <a:pPr>
+              <a:buFont typeface="Wingdings" charset="2"/>
+              <a:buChar char="Ø"/>
+            </a:pPr>
+            <a:r>
+              <a:rPr lang="fr-FR" dirty="0" smtClean="0"/>
+              <a:t>Solution : les générer</a:t>
+            </a:r>
+          </a:p>
+          <a:p>
+            <a:pPr>
+              <a:buFont typeface="Wingdings" charset="2"/>
+              <a:buChar char="Ø"/>
+            </a:pPr>
+            <a:r>
+              <a:rPr lang="fr-FR" dirty="0" smtClean="0"/>
+              <a:t>1</a:t>
+            </a:r>
+            <a:r>
+              <a:rPr lang="fr-FR" baseline="30000" dirty="0" smtClean="0"/>
+              <a:t>ère</a:t>
+            </a:r>
+            <a:r>
+              <a:rPr lang="fr-FR" dirty="0" smtClean="0"/>
+              <a:t> phase : récupération de données </a:t>
+            </a:r>
+            <a:r>
+              <a:rPr lang="fr-FR" dirty="0" smtClean="0">
+                <a:sym typeface="Wingdings"/>
+              </a:rPr>
+              <a:t> bot faisant des requêtes vers </a:t>
+            </a:r>
+            <a:r>
+              <a:rPr lang="fr-FR" sz="2000" i="1" dirty="0" smtClean="0">
+                <a:sym typeface="Wingdings"/>
+              </a:rPr>
+              <a:t>http://</a:t>
+            </a:r>
+            <a:r>
+              <a:rPr lang="fr-FR" sz="2000" i="1" dirty="0" err="1" smtClean="0">
+                <a:sym typeface="Wingdings"/>
+              </a:rPr>
+              <a:t>alexa</a:t>
+            </a:r>
+            <a:r>
+              <a:rPr lang="fr-FR" sz="2000" i="1" dirty="0" smtClean="0">
+                <a:sym typeface="Wingdings"/>
+              </a:rPr>
+              <a:t> .</a:t>
+            </a:r>
+            <a:r>
+              <a:rPr lang="fr-FR" sz="2000" i="1" dirty="0" err="1" smtClean="0">
+                <a:sym typeface="Wingdings"/>
+              </a:rPr>
+              <a:t>com</a:t>
+            </a:r>
+            <a:r>
+              <a:rPr lang="fr-FR" sz="2000" i="1" dirty="0" smtClean="0">
+                <a:sym typeface="Wingdings"/>
+              </a:rPr>
+              <a:t> (site informatif sur les pages web du net)  Stockage en XML</a:t>
+            </a:r>
+          </a:p>
+          <a:p>
+            <a:pPr>
+              <a:buFont typeface="Wingdings" charset="2"/>
+              <a:buChar char="Ø"/>
+            </a:pPr>
+            <a:r>
+              <a:rPr lang="fr-FR" dirty="0" smtClean="0">
+                <a:sym typeface="Wingdings"/>
+              </a:rPr>
+              <a:t>2</a:t>
+            </a:r>
+            <a:r>
+              <a:rPr lang="fr-FR" baseline="30000" dirty="0" smtClean="0">
+                <a:sym typeface="Wingdings"/>
+              </a:rPr>
+              <a:t>nd</a:t>
+            </a:r>
+            <a:r>
+              <a:rPr lang="fr-FR" dirty="0" smtClean="0">
+                <a:sym typeface="Wingdings"/>
+              </a:rPr>
+              <a:t> phase : choix d’un nombre d’individus et d’un nombre de racines puis création de branche de navigation (utilisation des parents)</a:t>
+            </a:r>
+          </a:p>
+          <a:p>
+            <a:pPr marL="0" indent="0">
+              <a:buNone/>
+            </a:pPr>
+            <a:endParaRPr lang="fr-FR" dirty="0"/>
+          </a:p>
+        </p:txBody>
+      </p:sp>
+      <p:pic>
+        <p:nvPicPr>
+          <p:cNvPr id="4" name="Image 3" descr="logominesnancy_transp.png"/>
+          <p:cNvPicPr>
+            <a:picLocks noChangeAspect="1"/>
+          </p:cNvPicPr>
+          <p:nvPr/>
+        </p:nvPicPr>
+        <p:blipFill>
+          <a:blip r:embed="rId2">
+            <a:extLst>
+              <a:ext uri="{28A0092B-C50C-407E-A947-70E740481C1C}">
+                <a14:useLocalDpi xmlns:a14="http://schemas.microsoft.com/office/drawing/2010/main" val="0"/>
+              </a:ext>
+            </a:extLst>
+          </a:blip>
+          <a:stretch>
+            <a:fillRect/>
+          </a:stretch>
+        </p:blipFill>
+        <p:spPr>
+          <a:xfrm>
+            <a:off x="-153988" y="5562600"/>
+            <a:ext cx="2183674" cy="1295400"/>
+          </a:xfrm>
+          <a:prstGeom prst="rect">
+            <a:avLst/>
+          </a:prstGeom>
+        </p:spPr>
+      </p:pic>
+      <p:sp>
+        <p:nvSpPr>
+          <p:cNvPr id="5" name="ZoneTexte 4"/>
+          <p:cNvSpPr txBox="1"/>
+          <p:nvPr/>
+        </p:nvSpPr>
+        <p:spPr>
+          <a:xfrm>
+            <a:off x="4037012" y="6324600"/>
+            <a:ext cx="4267200" cy="346249"/>
+          </a:xfrm>
+          <a:prstGeom prst="rect">
+            <a:avLst/>
+          </a:prstGeom>
+          <a:noFill/>
+        </p:spPr>
+        <p:txBody>
+          <a:bodyPr wrap="square" rtlCol="0">
+            <a:spAutoFit/>
+          </a:bodyPr>
+          <a:lstStyle/>
+          <a:p>
+            <a:pPr algn="ctr">
+              <a:lnSpc>
+                <a:spcPct val="90000"/>
+              </a:lnSpc>
+            </a:pPr>
+            <a:r>
+              <a:rPr lang="fr-FR" dirty="0" smtClean="0"/>
+              <a:t>Soutenance projet 3A – </a:t>
+            </a:r>
+            <a:r>
+              <a:rPr lang="fr-FR" dirty="0" err="1" smtClean="0"/>
+              <a:t>Lauwérière</a:t>
+            </a:r>
+            <a:r>
+              <a:rPr lang="fr-FR" dirty="0" smtClean="0"/>
+              <a:t> Fabrice</a:t>
+            </a:r>
+            <a:endParaRPr lang="fr-FR" dirty="0"/>
+          </a:p>
+        </p:txBody>
+      </p:sp>
+      <p:sp>
+        <p:nvSpPr>
+          <p:cNvPr id="6" name="Espace réservé du numéro de diapositive 5"/>
+          <p:cNvSpPr>
+            <a:spLocks noGrp="1"/>
+          </p:cNvSpPr>
+          <p:nvPr>
+            <p:ph type="sldNum" sz="quarter" idx="12"/>
+          </p:nvPr>
+        </p:nvSpPr>
+        <p:spPr/>
+        <p:txBody>
+          <a:bodyPr/>
+          <a:lstStyle/>
+          <a:p>
+            <a:fld id="{2A013F82-EE5E-44EE-A61D-E31C6657F26F}" type="slidenum">
+              <a:rPr lang="fr-FR" smtClean="0"/>
+              <a:t>3</a:t>
+            </a:fld>
+            <a:endParaRPr lang="fr-FR"/>
+          </a:p>
+        </p:txBody>
+      </p:sp>
+    </p:spTree>
+    <p:extLst>
+      <p:ext uri="{BB962C8B-B14F-4D97-AF65-F5344CB8AC3E}">
+        <p14:creationId xmlns:p14="http://schemas.microsoft.com/office/powerpoint/2010/main" val="168483983"/>
+      </p:ext>
+    </p:extLst>
+  </p:cSld>
+  <p:clrMapOvr>
+    <a:masterClrMapping/>
+  </p:clrMapOvr>
+  <mc:AlternateContent xmlns:mc="http://schemas.openxmlformats.org/markup-compatibility/2006" xmlns:p14="http://schemas.microsoft.com/office/powerpoint/2010/main">
+    <mc:Choice Requires="p14">
+      <p:transition spd="med" p14:dur="700">
+        <p:fade/>
+      </p:transition>
+    </mc:Choice>
+    <mc:Fallback xmlns="">
+      <p:transition spd="med">
+        <p:fade/>
+      </p:transition>
+    </mc:Fallback>
+  </mc:AlternateContent>
+</p:sld>
+</file>
+
+<file path=ppt/slides/slide5.xml><?xml version="1.0" encoding="utf-8"?>
+<p:sld xmlns:a="http://schemas.openxmlformats.org/drawingml/2006/main" xmlns:r="http://schemas.openxmlformats.org/officeDocument/2006/relationships" xmlns:p="http://schemas.openxmlformats.org/presentationml/2006/main">
+  <p:cSld>
+    <p:spTree>
+      <p:nvGrpSpPr>
+        <p:cNvPr id="1" name=""/>
+        <p:cNvGrpSpPr/>
+        <p:nvPr/>
+      </p:nvGrpSpPr>
+      <p:grpSpPr>
+        <a:xfrm>
+          <a:off x="0" y="0"/>
+          <a:ext cx="0" cy="0"/>
+          <a:chOff x="0" y="0"/>
+          <a:chExt cx="0" cy="0"/>
+        </a:xfrm>
+      </p:grpSpPr>
+      <p:sp>
+        <p:nvSpPr>
+          <p:cNvPr id="2" name="Titre 1"/>
+          <p:cNvSpPr>
+            <a:spLocks noGrp="1"/>
+          </p:cNvSpPr>
+          <p:nvPr>
+            <p:ph type="title"/>
+          </p:nvPr>
+        </p:nvSpPr>
+        <p:spPr>
+          <a:xfrm>
+            <a:off x="379412" y="381000"/>
+            <a:ext cx="11506199" cy="838200"/>
+          </a:xfrm>
+        </p:spPr>
+        <p:txBody>
+          <a:bodyPr/>
+          <a:lstStyle/>
+          <a:p>
+            <a:r>
+              <a:rPr lang="fr-FR" dirty="0" smtClean="0"/>
+              <a:t>La création des branches de navigation</a:t>
+            </a:r>
+            <a:endParaRPr lang="fr-FR" dirty="0"/>
+          </a:p>
+        </p:txBody>
+      </p:sp>
+      <p:sp>
+        <p:nvSpPr>
+          <p:cNvPr id="3" name="Espace réservé du contenu 2"/>
+          <p:cNvSpPr>
+            <a:spLocks noGrp="1"/>
+          </p:cNvSpPr>
+          <p:nvPr>
+            <p:ph idx="1"/>
+          </p:nvPr>
+        </p:nvSpPr>
+        <p:spPr>
+          <a:xfrm>
+            <a:off x="1522413" y="1904999"/>
+            <a:ext cx="9296399" cy="4114801"/>
+          </a:xfrm>
+        </p:spPr>
+        <p:txBody>
+          <a:bodyPr/>
+          <a:lstStyle/>
+          <a:p>
+            <a:pPr>
+              <a:buFont typeface="Wingdings" charset="2"/>
+              <a:buChar char="Ø"/>
+            </a:pPr>
+            <a:r>
+              <a:rPr lang="fr-FR" dirty="0" smtClean="0"/>
+              <a:t>(schéma avec les pourcentage de choix et de sauvetage)</a:t>
+            </a:r>
+            <a:endParaRPr lang="fr-FR" dirty="0" smtClean="0">
+              <a:sym typeface="Wingdings"/>
+            </a:endParaRPr>
+          </a:p>
+          <a:p>
+            <a:pPr marL="0" indent="0">
+              <a:buNone/>
+            </a:pPr>
+            <a:endParaRPr lang="fr-FR" dirty="0"/>
+          </a:p>
+        </p:txBody>
+      </p:sp>
+      <p:pic>
+        <p:nvPicPr>
+          <p:cNvPr id="4" name="Image 3" descr="logominesnancy_transp.png"/>
+          <p:cNvPicPr>
+            <a:picLocks noChangeAspect="1"/>
+          </p:cNvPicPr>
+          <p:nvPr/>
+        </p:nvPicPr>
+        <p:blipFill>
+          <a:blip r:embed="rId2">
+            <a:extLst>
+              <a:ext uri="{28A0092B-C50C-407E-A947-70E740481C1C}">
+                <a14:useLocalDpi xmlns:a14="http://schemas.microsoft.com/office/drawing/2010/main" val="0"/>
+              </a:ext>
+            </a:extLst>
+          </a:blip>
+          <a:stretch>
+            <a:fillRect/>
+          </a:stretch>
+        </p:blipFill>
+        <p:spPr>
+          <a:xfrm>
+            <a:off x="-153988" y="5562600"/>
+            <a:ext cx="2183674" cy="1295400"/>
+          </a:xfrm>
+          <a:prstGeom prst="rect">
+            <a:avLst/>
+          </a:prstGeom>
+        </p:spPr>
+      </p:pic>
+      <p:sp>
+        <p:nvSpPr>
+          <p:cNvPr id="5" name="ZoneTexte 4"/>
+          <p:cNvSpPr txBox="1"/>
+          <p:nvPr/>
+        </p:nvSpPr>
+        <p:spPr>
+          <a:xfrm>
+            <a:off x="4037012" y="6324600"/>
+            <a:ext cx="4267200" cy="346249"/>
+          </a:xfrm>
+          <a:prstGeom prst="rect">
+            <a:avLst/>
+          </a:prstGeom>
+          <a:noFill/>
+        </p:spPr>
+        <p:txBody>
+          <a:bodyPr wrap="square" rtlCol="0">
+            <a:spAutoFit/>
+          </a:bodyPr>
+          <a:lstStyle/>
+          <a:p>
+            <a:pPr algn="ctr">
+              <a:lnSpc>
+                <a:spcPct val="90000"/>
+              </a:lnSpc>
+            </a:pPr>
+            <a:r>
+              <a:rPr lang="fr-FR" dirty="0" smtClean="0"/>
+              <a:t>Soutenance projet 3A – </a:t>
+            </a:r>
+            <a:r>
+              <a:rPr lang="fr-FR" dirty="0" err="1" smtClean="0"/>
+              <a:t>Lauwérière</a:t>
+            </a:r>
+            <a:r>
+              <a:rPr lang="fr-FR" dirty="0" smtClean="0"/>
+              <a:t> Fabrice</a:t>
+            </a:r>
+            <a:endParaRPr lang="fr-FR" dirty="0"/>
+          </a:p>
+        </p:txBody>
+      </p:sp>
+      <p:sp>
+        <p:nvSpPr>
+          <p:cNvPr id="6" name="Espace réservé du numéro de diapositive 5"/>
+          <p:cNvSpPr>
+            <a:spLocks noGrp="1"/>
+          </p:cNvSpPr>
+          <p:nvPr>
+            <p:ph type="sldNum" sz="quarter" idx="12"/>
+          </p:nvPr>
+        </p:nvSpPr>
+        <p:spPr/>
+        <p:txBody>
+          <a:bodyPr/>
+          <a:lstStyle/>
+          <a:p>
+            <a:fld id="{2A013F82-EE5E-44EE-A61D-E31C6657F26F}" type="slidenum">
+              <a:rPr lang="fr-FR" smtClean="0"/>
+              <a:t>4</a:t>
+            </a:fld>
+            <a:endParaRPr lang="fr-FR"/>
+          </a:p>
+        </p:txBody>
+      </p:sp>
+    </p:spTree>
+    <p:extLst>
+      <p:ext uri="{BB962C8B-B14F-4D97-AF65-F5344CB8AC3E}">
+        <p14:creationId xmlns:p14="http://schemas.microsoft.com/office/powerpoint/2010/main" val="959339953"/>
+      </p:ext>
+    </p:extLst>
+  </p:cSld>
+  <p:clrMapOvr>
+    <a:masterClrMapping/>
+  </p:clrMapOvr>
+  <mc:AlternateContent xmlns:mc="http://schemas.openxmlformats.org/markup-compatibility/2006" xmlns:p14="http://schemas.microsoft.com/office/powerpoint/2010/main">
+    <mc:Choice Requires="p14">
+      <p:transition spd="med" p14:dur="700">
+        <p:fade/>
+      </p:transition>
+    </mc:Choice>
+    <mc:Fallback xmlns="">
+      <p:transition spd="med">
+        <p:fade/>
+      </p:transition>
+    </mc:Fallback>
+  </mc:AlternateContent>
+</p:sld>
+</file>
+
+<file path=ppt/slides/slide6.xml><?xml version="1.0" encoding="utf-8"?>
+<p:sld xmlns:a="http://schemas.openxmlformats.org/drawingml/2006/main" xmlns:r="http://schemas.openxmlformats.org/officeDocument/2006/relationships" xmlns:p="http://schemas.openxmlformats.org/presentationml/2006/main">
+  <p:cSld>
+    <p:spTree>
+      <p:nvGrpSpPr>
+        <p:cNvPr id="1" name=""/>
+        <p:cNvGrpSpPr/>
+        <p:nvPr/>
+      </p:nvGrpSpPr>
+      <p:grpSpPr>
+        <a:xfrm>
+          <a:off x="0" y="0"/>
+          <a:ext cx="0" cy="0"/>
+          <a:chOff x="0" y="0"/>
+          <a:chExt cx="0" cy="0"/>
+        </a:xfrm>
+      </p:grpSpPr>
+      <p:sp>
+        <p:nvSpPr>
+          <p:cNvPr id="2" name="Titre 1"/>
+          <p:cNvSpPr>
+            <a:spLocks noGrp="1"/>
+          </p:cNvSpPr>
+          <p:nvPr>
+            <p:ph type="title"/>
+          </p:nvPr>
+        </p:nvSpPr>
+        <p:spPr>
+          <a:xfrm>
+            <a:off x="379412" y="381000"/>
+            <a:ext cx="11506199" cy="838200"/>
+          </a:xfrm>
+        </p:spPr>
+        <p:txBody>
+          <a:bodyPr>
+            <a:normAutofit fontScale="90000"/>
+          </a:bodyPr>
+          <a:lstStyle/>
+          <a:p>
+            <a:r>
+              <a:rPr lang="fr-FR" dirty="0" smtClean="0"/>
+              <a:t>III- Préparation des données puis passage dans l’algorithme</a:t>
+            </a:r>
+            <a:endParaRPr lang="fr-FR" dirty="0"/>
+          </a:p>
+        </p:txBody>
+      </p:sp>
+      <p:sp>
+        <p:nvSpPr>
+          <p:cNvPr id="3" name="Espace réservé du contenu 2"/>
+          <p:cNvSpPr>
+            <a:spLocks noGrp="1"/>
+          </p:cNvSpPr>
+          <p:nvPr>
+            <p:ph idx="1"/>
+          </p:nvPr>
+        </p:nvSpPr>
+        <p:spPr>
+          <a:xfrm>
+            <a:off x="1522413" y="1904999"/>
+            <a:ext cx="9296399" cy="4114801"/>
+          </a:xfrm>
+        </p:spPr>
+        <p:txBody>
+          <a:bodyPr/>
+          <a:lstStyle/>
+          <a:p>
+            <a:pPr>
+              <a:buFont typeface="Wingdings" charset="2"/>
+              <a:buChar char="Ø"/>
+            </a:pPr>
+            <a:r>
+              <a:rPr lang="fr-FR" dirty="0" smtClean="0"/>
+              <a:t>Tri des données puis insertion d’individu(s) atypiques (&lt;50%)</a:t>
+            </a:r>
+          </a:p>
+          <a:p>
+            <a:pPr>
+              <a:buFont typeface="Wingdings" charset="2"/>
+              <a:buChar char="Ø"/>
+            </a:pPr>
+            <a:r>
+              <a:rPr lang="fr-FR" dirty="0" smtClean="0"/>
+              <a:t>Passage dans l’algorithme</a:t>
+            </a:r>
+          </a:p>
+          <a:p>
+            <a:pPr lvl="1">
+              <a:buFont typeface="Wingdings" charset="2"/>
+              <a:buChar char="Ø"/>
+            </a:pPr>
+            <a:r>
+              <a:rPr lang="fr-FR" dirty="0" smtClean="0"/>
+              <a:t>(dessin des matrices + fonction de </a:t>
+            </a:r>
+            <a:r>
+              <a:rPr lang="fr-FR" dirty="0" err="1" smtClean="0"/>
+              <a:t>selection</a:t>
+            </a:r>
+            <a:r>
+              <a:rPr lang="fr-FR" dirty="0" smtClean="0"/>
+              <a:t> et </a:t>
+            </a:r>
+            <a:r>
+              <a:rPr lang="fr-FR" dirty="0" err="1" smtClean="0"/>
+              <a:t>penalité</a:t>
+            </a:r>
+            <a:r>
+              <a:rPr lang="fr-FR" dirty="0" smtClean="0"/>
+              <a:t> pour explication de l’</a:t>
+            </a:r>
+            <a:r>
+              <a:rPr lang="fr-FR" dirty="0" err="1" smtClean="0"/>
+              <a:t>algo</a:t>
+            </a:r>
+            <a:r>
+              <a:rPr lang="fr-FR" dirty="0" smtClean="0"/>
+              <a:t>)</a:t>
+            </a:r>
+            <a:endParaRPr lang="fr-FR" dirty="0"/>
+          </a:p>
+        </p:txBody>
+      </p:sp>
+      <p:pic>
+        <p:nvPicPr>
+          <p:cNvPr id="4" name="Image 3" descr="logominesnancy_transp.png"/>
+          <p:cNvPicPr>
+            <a:picLocks noChangeAspect="1"/>
+          </p:cNvPicPr>
+          <p:nvPr/>
+        </p:nvPicPr>
+        <p:blipFill>
+          <a:blip r:embed="rId2">
+            <a:extLst>
+              <a:ext uri="{28A0092B-C50C-407E-A947-70E740481C1C}">
+                <a14:useLocalDpi xmlns:a14="http://schemas.microsoft.com/office/drawing/2010/main" val="0"/>
+              </a:ext>
+            </a:extLst>
+          </a:blip>
+          <a:stretch>
+            <a:fillRect/>
+          </a:stretch>
+        </p:blipFill>
+        <p:spPr>
+          <a:xfrm>
+            <a:off x="-153988" y="5562600"/>
+            <a:ext cx="2183674" cy="1295400"/>
+          </a:xfrm>
+          <a:prstGeom prst="rect">
+            <a:avLst/>
+          </a:prstGeom>
+        </p:spPr>
+      </p:pic>
+      <p:sp>
+        <p:nvSpPr>
+          <p:cNvPr id="5" name="ZoneTexte 4"/>
+          <p:cNvSpPr txBox="1"/>
+          <p:nvPr/>
+        </p:nvSpPr>
+        <p:spPr>
+          <a:xfrm>
+            <a:off x="4037012" y="6324600"/>
+            <a:ext cx="4267200" cy="346249"/>
+          </a:xfrm>
+          <a:prstGeom prst="rect">
+            <a:avLst/>
+          </a:prstGeom>
+          <a:noFill/>
+        </p:spPr>
+        <p:txBody>
+          <a:bodyPr wrap="square" rtlCol="0">
+            <a:spAutoFit/>
+          </a:bodyPr>
+          <a:lstStyle/>
+          <a:p>
+            <a:pPr algn="ctr">
+              <a:lnSpc>
+                <a:spcPct val="90000"/>
+              </a:lnSpc>
+            </a:pPr>
+            <a:r>
+              <a:rPr lang="fr-FR" dirty="0" smtClean="0"/>
+              <a:t>Soutenance projet 3A – </a:t>
+            </a:r>
+            <a:r>
+              <a:rPr lang="fr-FR" dirty="0" err="1" smtClean="0"/>
+              <a:t>Lauwérière</a:t>
+            </a:r>
+            <a:r>
+              <a:rPr lang="fr-FR" dirty="0" smtClean="0"/>
+              <a:t> Fabrice</a:t>
+            </a:r>
+            <a:endParaRPr lang="fr-FR" dirty="0"/>
+          </a:p>
+        </p:txBody>
+      </p:sp>
+      <p:sp>
+        <p:nvSpPr>
+          <p:cNvPr id="6" name="Espace réservé du numéro de diapositive 5"/>
+          <p:cNvSpPr>
+            <a:spLocks noGrp="1"/>
+          </p:cNvSpPr>
+          <p:nvPr>
+            <p:ph type="sldNum" sz="quarter" idx="12"/>
+          </p:nvPr>
+        </p:nvSpPr>
+        <p:spPr/>
+        <p:txBody>
+          <a:bodyPr/>
+          <a:lstStyle/>
+          <a:p>
+            <a:fld id="{2A013F82-EE5E-44EE-A61D-E31C6657F26F}" type="slidenum">
+              <a:rPr lang="fr-FR" smtClean="0"/>
+              <a:t>5</a:t>
+            </a:fld>
+            <a:endParaRPr lang="fr-FR"/>
+          </a:p>
+        </p:txBody>
+      </p:sp>
+    </p:spTree>
+    <p:extLst>
+      <p:ext uri="{BB962C8B-B14F-4D97-AF65-F5344CB8AC3E}">
+        <p14:creationId xmlns:p14="http://schemas.microsoft.com/office/powerpoint/2010/main" val="3891018935"/>
+      </p:ext>
+    </p:extLst>
+  </p:cSld>
+  <p:clrMapOvr>
+    <a:masterClrMapping/>
+  </p:clrMapOvr>
+  <mc:AlternateContent xmlns:mc="http://schemas.openxmlformats.org/markup-compatibility/2006" xmlns:p14="http://schemas.microsoft.com/office/powerpoint/2010/main">
+    <mc:Choice Requires="p14">
+      <p:transition spd="med" p14:dur="700">
+        <p:fade/>
+      </p:transition>
+    </mc:Choice>
+    <mc:Fallback xmlns="">
+      <p:transition spd="med">
+        <p:fade/>
+      </p:transition>
+    </mc:Fallback>
+  </mc:AlternateContent>
+</p:sld>
+</file>
+
+<file path=ppt/slides/slide7.xml><?xml version="1.0" encoding="utf-8"?>
+<p:sld xmlns:a="http://schemas.openxmlformats.org/drawingml/2006/main" xmlns:r="http://schemas.openxmlformats.org/officeDocument/2006/relationships" xmlns:p="http://schemas.openxmlformats.org/presentationml/2006/main">
+  <p:cSld>
+    <p:spTree>
+      <p:nvGrpSpPr>
+        <p:cNvPr id="1" name=""/>
+        <p:cNvGrpSpPr/>
+        <p:nvPr/>
+      </p:nvGrpSpPr>
+      <p:grpSpPr>
+        <a:xfrm>
+          <a:off x="0" y="0"/>
+          <a:ext cx="0" cy="0"/>
+          <a:chOff x="0" y="0"/>
+          <a:chExt cx="0" cy="0"/>
+        </a:xfrm>
+      </p:grpSpPr>
+      <p:sp>
+        <p:nvSpPr>
+          <p:cNvPr id="2" name="Titre 1"/>
+          <p:cNvSpPr>
+            <a:spLocks noGrp="1"/>
+          </p:cNvSpPr>
+          <p:nvPr>
+            <p:ph type="title"/>
+          </p:nvPr>
+        </p:nvSpPr>
+        <p:spPr>
+          <a:xfrm>
+            <a:off x="379412" y="381000"/>
+            <a:ext cx="11506199" cy="838200"/>
+          </a:xfrm>
+        </p:spPr>
+        <p:txBody>
+          <a:bodyPr>
+            <a:normAutofit/>
+          </a:bodyPr>
+          <a:lstStyle/>
+          <a:p>
+            <a:r>
+              <a:rPr lang="fr-FR" dirty="0" smtClean="0"/>
+              <a:t>IV- Analyse du </a:t>
+            </a:r>
+            <a:r>
+              <a:rPr lang="fr-FR" dirty="0" err="1" smtClean="0"/>
+              <a:t>processing</a:t>
+            </a:r>
+            <a:r>
+              <a:rPr lang="fr-FR" dirty="0" smtClean="0"/>
+              <a:t> et des résultats</a:t>
+            </a:r>
+            <a:endParaRPr lang="fr-FR" dirty="0"/>
+          </a:p>
+        </p:txBody>
+      </p:sp>
+      <p:sp>
+        <p:nvSpPr>
+          <p:cNvPr id="3" name="Espace réservé du contenu 2"/>
+          <p:cNvSpPr>
+            <a:spLocks noGrp="1"/>
+          </p:cNvSpPr>
+          <p:nvPr>
+            <p:ph idx="1"/>
+          </p:nvPr>
+        </p:nvSpPr>
+        <p:spPr>
+          <a:xfrm>
+            <a:off x="1522413" y="1904999"/>
+            <a:ext cx="9296399" cy="4114801"/>
+          </a:xfrm>
+        </p:spPr>
+        <p:txBody>
+          <a:bodyPr/>
+          <a:lstStyle/>
+          <a:p>
+            <a:pPr>
+              <a:buFont typeface="Wingdings" charset="2"/>
+              <a:buChar char="Ø"/>
+            </a:pPr>
+            <a:r>
+              <a:rPr lang="fr-FR" dirty="0" smtClean="0"/>
+              <a:t>Complexité et temps de calcul</a:t>
+            </a:r>
+          </a:p>
+          <a:p>
+            <a:pPr lvl="1">
+              <a:buFont typeface="Wingdings" charset="2"/>
+              <a:buChar char="Ø"/>
+            </a:pPr>
+            <a:r>
+              <a:rPr lang="fr-FR" dirty="0" smtClean="0"/>
+              <a:t>Impossibilité de traiter de grande valeur en un temps acceptable</a:t>
+            </a:r>
+          </a:p>
+          <a:p>
+            <a:pPr lvl="1">
+              <a:buFont typeface="Wingdings" charset="2"/>
+              <a:buChar char="Ø"/>
+            </a:pPr>
+            <a:r>
+              <a:rPr lang="fr-FR" dirty="0" smtClean="0"/>
+              <a:t>Exemples de temps de calcul</a:t>
+            </a:r>
+          </a:p>
+          <a:p>
+            <a:pPr>
+              <a:buFont typeface="Wingdings" charset="2"/>
+              <a:buChar char="Ø"/>
+            </a:pPr>
+            <a:r>
+              <a:rPr lang="fr-FR" dirty="0" smtClean="0"/>
+              <a:t>Validité des résultats</a:t>
+            </a:r>
+            <a:endParaRPr lang="fr-FR" dirty="0"/>
+          </a:p>
+        </p:txBody>
+      </p:sp>
+      <p:pic>
+        <p:nvPicPr>
+          <p:cNvPr id="4" name="Image 3" descr="logominesnancy_transp.png"/>
+          <p:cNvPicPr>
+            <a:picLocks noChangeAspect="1"/>
+          </p:cNvPicPr>
+          <p:nvPr/>
+        </p:nvPicPr>
+        <p:blipFill>
+          <a:blip r:embed="rId2">
+            <a:extLst>
+              <a:ext uri="{28A0092B-C50C-407E-A947-70E740481C1C}">
+                <a14:useLocalDpi xmlns:a14="http://schemas.microsoft.com/office/drawing/2010/main" val="0"/>
+              </a:ext>
+            </a:extLst>
+          </a:blip>
+          <a:stretch>
+            <a:fillRect/>
+          </a:stretch>
+        </p:blipFill>
+        <p:spPr>
+          <a:xfrm>
+            <a:off x="-153988" y="5562600"/>
+            <a:ext cx="2183674" cy="1295400"/>
+          </a:xfrm>
+          <a:prstGeom prst="rect">
+            <a:avLst/>
+          </a:prstGeom>
+        </p:spPr>
+      </p:pic>
+      <p:sp>
+        <p:nvSpPr>
+          <p:cNvPr id="5" name="ZoneTexte 4"/>
+          <p:cNvSpPr txBox="1"/>
+          <p:nvPr/>
+        </p:nvSpPr>
+        <p:spPr>
+          <a:xfrm>
+            <a:off x="4037012" y="6324600"/>
+            <a:ext cx="4267200" cy="346249"/>
+          </a:xfrm>
+          <a:prstGeom prst="rect">
+            <a:avLst/>
+          </a:prstGeom>
+          <a:noFill/>
+        </p:spPr>
+        <p:txBody>
+          <a:bodyPr wrap="square" rtlCol="0">
+            <a:spAutoFit/>
+          </a:bodyPr>
+          <a:lstStyle/>
+          <a:p>
+            <a:pPr algn="ctr">
+              <a:lnSpc>
+                <a:spcPct val="90000"/>
+              </a:lnSpc>
+            </a:pPr>
+            <a:r>
+              <a:rPr lang="fr-FR" dirty="0" smtClean="0"/>
+              <a:t>Soutenance projet 3A – </a:t>
+            </a:r>
+            <a:r>
+              <a:rPr lang="fr-FR" dirty="0" err="1" smtClean="0"/>
+              <a:t>Lauwérière</a:t>
+            </a:r>
+            <a:r>
+              <a:rPr lang="fr-FR" dirty="0" smtClean="0"/>
+              <a:t> Fabrice</a:t>
+            </a:r>
+            <a:endParaRPr lang="fr-FR" dirty="0"/>
+          </a:p>
+        </p:txBody>
+      </p:sp>
+      <p:sp>
+        <p:nvSpPr>
+          <p:cNvPr id="6" name="Espace réservé du numéro de diapositive 5"/>
+          <p:cNvSpPr>
+            <a:spLocks noGrp="1"/>
+          </p:cNvSpPr>
+          <p:nvPr>
+            <p:ph type="sldNum" sz="quarter" idx="12"/>
+          </p:nvPr>
+        </p:nvSpPr>
+        <p:spPr/>
+        <p:txBody>
+          <a:bodyPr/>
+          <a:lstStyle/>
+          <a:p>
+            <a:fld id="{2A013F82-EE5E-44EE-A61D-E31C6657F26F}" type="slidenum">
+              <a:rPr lang="fr-FR" smtClean="0"/>
+              <a:t>6</a:t>
+            </a:fld>
+            <a:endParaRPr lang="fr-FR"/>
+          </a:p>
+        </p:txBody>
+      </p:sp>
+    </p:spTree>
+    <p:extLst>
+      <p:ext uri="{BB962C8B-B14F-4D97-AF65-F5344CB8AC3E}">
+        <p14:creationId xmlns:p14="http://schemas.microsoft.com/office/powerpoint/2010/main" val="1031449851"/>
+      </p:ext>
+    </p:extLst>
+  </p:cSld>
+  <p:clrMapOvr>
+    <a:masterClrMapping/>
+  </p:clrMapOvr>
+  <mc:AlternateContent xmlns:mc="http://schemas.openxmlformats.org/markup-compatibility/2006" xmlns:p14="http://schemas.microsoft.com/office/powerpoint/2010/main">
+    <mc:Choice Requires="p14">
+      <p:transition spd="med" p14:dur="700">
+        <p:fade/>
+      </p:transition>
+    </mc:Choice>
+    <mc:Fallback xmlns="">
+      <p:transition spd="med">
+        <p:fade/>
+      </p:transition>
+    </mc:Fallback>
+  </mc:AlternateContent>
+</p:sld>
+</file>
+
+<file path=ppt/slides/slide8.xml><?xml version="1.0" encoding="utf-8"?>
+<p:sld xmlns:a="http://schemas.openxmlformats.org/drawingml/2006/main" xmlns:r="http://schemas.openxmlformats.org/officeDocument/2006/relationships" xmlns:p="http://schemas.openxmlformats.org/presentationml/2006/main">
+  <p:cSld>
+    <p:spTree>
+      <p:nvGrpSpPr>
+        <p:cNvPr id="1" name=""/>
+        <p:cNvGrpSpPr/>
+        <p:nvPr/>
+      </p:nvGrpSpPr>
+      <p:grpSpPr>
+        <a:xfrm>
+          <a:off x="0" y="0"/>
+          <a:ext cx="0" cy="0"/>
+          <a:chOff x="0" y="0"/>
+          <a:chExt cx="0" cy="0"/>
+        </a:xfrm>
+      </p:grpSpPr>
+      <p:sp>
+        <p:nvSpPr>
+          <p:cNvPr id="2" name="Titre 1"/>
+          <p:cNvSpPr>
+            <a:spLocks noGrp="1"/>
+          </p:cNvSpPr>
+          <p:nvPr>
+            <p:ph type="ctrTitle"/>
+          </p:nvPr>
+        </p:nvSpPr>
+        <p:spPr>
+          <a:xfrm>
+            <a:off x="1293812" y="1828800"/>
+            <a:ext cx="9753598" cy="1905000"/>
+          </a:xfrm>
+        </p:spPr>
+        <p:txBody>
+          <a:bodyPr/>
+          <a:lstStyle/>
+          <a:p>
+            <a:pPr algn="ctr"/>
+            <a:r>
+              <a:rPr lang="fr-FR" dirty="0" smtClean="0"/>
+              <a:t>Merci de votre attention</a:t>
+            </a:r>
+            <a:endParaRPr lang="fr-FR" dirty="0"/>
+          </a:p>
+        </p:txBody>
+      </p:sp>
+      <p:sp>
+        <p:nvSpPr>
+          <p:cNvPr id="3" name="Sous-titre 2"/>
+          <p:cNvSpPr>
+            <a:spLocks noGrp="1"/>
+          </p:cNvSpPr>
+          <p:nvPr>
+            <p:ph type="subTitle" idx="1"/>
+          </p:nvPr>
+        </p:nvSpPr>
+        <p:spPr>
+          <a:xfrm>
+            <a:off x="2208212" y="4800600"/>
+            <a:ext cx="8229600" cy="1219200"/>
+          </a:xfrm>
+        </p:spPr>
+        <p:txBody>
+          <a:bodyPr/>
+          <a:lstStyle/>
+          <a:p>
+            <a:pPr algn="ctr"/>
+            <a:r>
+              <a:rPr lang="fr-FR" dirty="0" smtClean="0"/>
+              <a:t>démonstration</a:t>
+            </a:r>
+            <a:endParaRPr lang="fr-FR" dirty="0"/>
+          </a:p>
+        </p:txBody>
+      </p:sp>
+      <p:pic>
+        <p:nvPicPr>
+          <p:cNvPr id="5" name="Image 4" descr="logominesnancy_transp.png"/>
+          <p:cNvPicPr>
+            <a:picLocks noChangeAspect="1"/>
+          </p:cNvPicPr>
+          <p:nvPr/>
+        </p:nvPicPr>
+        <p:blipFill>
+          <a:blip r:embed="rId2">
+            <a:extLst>
+              <a:ext uri="{28A0092B-C50C-407E-A947-70E740481C1C}">
+                <a14:useLocalDpi xmlns:a14="http://schemas.microsoft.com/office/drawing/2010/main" val="0"/>
+              </a:ext>
+            </a:extLst>
+          </a:blip>
+          <a:stretch>
+            <a:fillRect/>
+          </a:stretch>
+        </p:blipFill>
+        <p:spPr>
+          <a:xfrm>
+            <a:off x="8977539" y="4953000"/>
+            <a:ext cx="3211286" cy="1905000"/>
+          </a:xfrm>
+          <a:prstGeom prst="rect">
+            <a:avLst/>
+          </a:prstGeom>
+        </p:spPr>
+      </p:pic>
+    </p:spTree>
+    <p:extLst>
+      <p:ext uri="{BB962C8B-B14F-4D97-AF65-F5344CB8AC3E}">
+        <p14:creationId xmlns:p14="http://schemas.microsoft.com/office/powerpoint/2010/main" val="1783247899"/>
+      </p:ext>
+    </p:extLst>
+  </p:cSld>
+  <p:clrMapOvr>
+    <a:masterClrMapping/>
+  </p:clrMapOvr>
+  <mc:AlternateContent xmlns:mc="http://schemas.openxmlformats.org/markup-compatibility/2006" xmlns:p14="http://schemas.microsoft.com/office/powerpoint/2010/main">
+    <mc:Choice Requires="p14">
+      <p:transition spd="med" p14:dur="700">
+        <p:fade/>
+      </p:transition>
+    </mc:Choice>
+    <mc:Fallback xmlns="">
+      <p:transition spd="med">
+        <p:fade/>
+      </p:transition>
+    </mc:Fallback>
+  </mc:AlternateContent>
 </p:sld>
 </file>
 

</xml_diff>